<commit_message>
updated git repo reference
</commit_message>
<xml_diff>
--- a/lecture03.numpy.pandas/lecture03.pptx
+++ b/lecture03.numpy.pandas/lecture03.pptx
@@ -251,7 +251,7 @@
           <a:p>
             <a:fld id="{E871FE31-3812-3944-9707-6ECC70AFADCA}" type="datetimeFigureOut">
               <a:rPr lang="en-US" smtClean="0"/>
-              <a:t>10/7/16</a:t>
+              <a:t>6/24/19</a:t>
             </a:fld>
             <a:endParaRPr lang="en-US"/>
           </a:p>
@@ -315,38 +315,37 @@
           <a:p>
             <a:pPr lvl="0"/>
             <a:r>
-              <a:rPr lang="en-US" smtClean="0"/>
+              <a:rPr lang="en-US"/>
               <a:t>Click to edit Master text styles</a:t>
             </a:r>
           </a:p>
           <a:p>
             <a:pPr lvl="1"/>
             <a:r>
-              <a:rPr lang="en-US" smtClean="0"/>
+              <a:rPr lang="en-US"/>
               <a:t>Second level</a:t>
             </a:r>
           </a:p>
           <a:p>
             <a:pPr lvl="2"/>
             <a:r>
-              <a:rPr lang="en-US" smtClean="0"/>
+              <a:rPr lang="en-US"/>
               <a:t>Third level</a:t>
             </a:r>
           </a:p>
           <a:p>
             <a:pPr lvl="3"/>
             <a:r>
-              <a:rPr lang="en-US" smtClean="0"/>
+              <a:rPr lang="en-US"/>
               <a:t>Fourth level</a:t>
             </a:r>
           </a:p>
           <a:p>
             <a:pPr lvl="4"/>
             <a:r>
-              <a:rPr lang="en-US" smtClean="0"/>
+              <a:rPr lang="en-US"/>
               <a:t>Fifth level</a:t>
             </a:r>
-            <a:endParaRPr lang="en-US"/>
           </a:p>
         </p:txBody>
       </p:sp>
@@ -630,15 +629,7 @@
                 <a:ea typeface="+mn-ea" charset="0"/>
                 <a:cs typeface="+mn-ea" charset="0"/>
               </a:rPr>
-              <a:t> stands for?     N-</a:t>
-            </a:r>
-            <a:r>
-              <a:rPr lang="en-US" sz="2000" dirty="0" smtClean="0">
-                <a:latin typeface="+mn-lt" charset="0"/>
-                <a:ea typeface="+mn-ea" charset="0"/>
-                <a:cs typeface="+mn-ea" charset="0"/>
-              </a:rPr>
-              <a:t>dimensional</a:t>
+              <a:t> stands for?     N-dimensional</a:t>
             </a:r>
           </a:p>
           <a:p>
@@ -647,7 +638,7 @@
                 <a:spcPct val="0"/>
               </a:spcBef>
             </a:pPr>
-            <a:endParaRPr lang="en-US" sz="2000" dirty="0" smtClean="0">
+            <a:endParaRPr lang="en-US" sz="2000" dirty="0">
               <a:latin typeface="+mn-lt" charset="0"/>
               <a:ea typeface="+mn-ea" charset="0"/>
               <a:cs typeface="+mn-ea" charset="0"/>
@@ -660,7 +651,7 @@
               </a:spcBef>
             </a:pPr>
             <a:r>
-              <a:rPr lang="en-US" sz="2000" dirty="0" smtClean="0">
+              <a:rPr lang="en-US" sz="2000" dirty="0">
                 <a:latin typeface="+mn-lt" charset="0"/>
                 <a:ea typeface="+mn-ea" charset="0"/>
                 <a:cs typeface="+mn-ea" charset="0"/>
@@ -668,7 +659,7 @@
               <a:t>spell checker on numpy:</a:t>
             </a:r>
             <a:r>
-              <a:rPr lang="en-US" sz="2000" baseline="0" dirty="0" smtClean="0">
+              <a:rPr lang="en-US" sz="2000" baseline="0" dirty="0">
                 <a:latin typeface="+mn-lt" charset="0"/>
                 <a:ea typeface="+mn-ea" charset="0"/>
                 <a:cs typeface="+mn-ea" charset="0"/>
@@ -1419,19 +1410,18 @@
           <a:lstStyle/>
           <a:p>
             <a:r>
-              <a:rPr lang="en-US" smtClean="0"/>
+              <a:rPr lang="en-US"/>
               <a:t>Python golf</a:t>
             </a:r>
           </a:p>
           <a:p>
-            <a:endParaRPr lang="en-US" smtClean="0"/>
-          </a:p>
-          <a:p>
-            <a:r>
-              <a:rPr lang="en-US" smtClean="0"/>
+            <a:endParaRPr lang="en-US"/>
+          </a:p>
+          <a:p>
+            <a:r>
+              <a:rPr lang="en-US"/>
               <a:t>len(a)   or  a.size</a:t>
             </a:r>
-            <a:endParaRPr lang="en-US"/>
           </a:p>
         </p:txBody>
       </p:sp>
@@ -1690,15 +1680,7 @@
                 <a:ea typeface="+mn-ea" charset="0"/>
                 <a:cs typeface="+mn-ea" charset="0"/>
               </a:rPr>
-              <a:t>signed or unsigned </a:t>
-            </a:r>
-            <a:r>
-              <a:rPr lang="en-US" sz="2000" smtClean="0">
-                <a:latin typeface="+mn-lt" charset="0"/>
-                <a:ea typeface="+mn-ea" charset="0"/>
-                <a:cs typeface="+mn-ea" charset="0"/>
-              </a:rPr>
-              <a:t>ints</a:t>
+              <a:t>signed or unsigned ints</a:t>
             </a:r>
           </a:p>
           <a:p>
@@ -1708,18 +1690,13 @@
               </a:spcBef>
             </a:pPr>
             <a:r>
-              <a:rPr lang="en-US" sz="2000" smtClean="0">
+              <a:rPr lang="en-US" sz="2000">
                 <a:latin typeface="+mn-lt" charset="0"/>
                 <a:ea typeface="+mn-ea" charset="0"/>
                 <a:cs typeface="+mn-ea" charset="0"/>
               </a:rPr>
               <a:t>Correspond to C language implementation</a:t>
             </a:r>
-            <a:endParaRPr lang="en-US" sz="2000">
-              <a:latin typeface="+mn-lt" charset="0"/>
-              <a:ea typeface="+mn-ea" charset="0"/>
-              <a:cs typeface="+mn-ea" charset="0"/>
-            </a:endParaRPr>
           </a:p>
         </p:txBody>
       </p:sp>
@@ -2181,10 +2158,9 @@
           <a:lstStyle/>
           <a:p>
             <a:r>
-              <a:rPr lang="en-US" smtClean="0"/>
+              <a:rPr lang="en-US"/>
               <a:t>Python was written by people who have done a lot of programming &amp; debugging</a:t>
             </a:r>
-            <a:endParaRPr lang="en-US"/>
           </a:p>
         </p:txBody>
       </p:sp>
@@ -2312,25 +2288,17 @@
                 <a:ea typeface="+mn-ea" charset="0"/>
                 <a:cs typeface="+mn-ea" charset="0"/>
               </a:rPr>
-              <a:t> stands for?     N-</a:t>
-            </a:r>
-            <a:r>
-              <a:rPr lang="en-US" sz="2000" dirty="0" smtClean="0">
+              <a:t> stands for?     N-dimensional               module can</a:t>
+            </a:r>
+            <a:r>
+              <a:rPr lang="en-US" sz="2000" baseline="0" dirty="0">
                 <a:latin typeface="+mn-lt" charset="0"/>
                 <a:ea typeface="+mn-ea" charset="0"/>
                 <a:cs typeface="+mn-ea" charset="0"/>
               </a:rPr>
-              <a:t>dimensional               module can</a:t>
-            </a:r>
-            <a:r>
-              <a:rPr lang="en-US" sz="2000" baseline="0" dirty="0" smtClean="0">
-                <a:latin typeface="+mn-lt" charset="0"/>
-                <a:ea typeface="+mn-ea" charset="0"/>
-                <a:cs typeface="+mn-ea" charset="0"/>
-              </a:rPr>
               <a:t> be referred to as a package     site-packages directory</a:t>
             </a:r>
-            <a:endParaRPr lang="en-US" sz="2000" dirty="0" smtClean="0">
+            <a:endParaRPr lang="en-US" sz="2000" dirty="0">
               <a:latin typeface="+mn-lt" charset="0"/>
               <a:ea typeface="+mn-ea" charset="0"/>
               <a:cs typeface="+mn-ea" charset="0"/>
@@ -2342,7 +2310,7 @@
                 <a:spcPct val="0"/>
               </a:spcBef>
             </a:pPr>
-            <a:endParaRPr lang="en-US" sz="2000" dirty="0" smtClean="0">
+            <a:endParaRPr lang="en-US" sz="2000" dirty="0">
               <a:latin typeface="+mn-lt" charset="0"/>
               <a:ea typeface="+mn-ea" charset="0"/>
               <a:cs typeface="+mn-ea" charset="0"/>
@@ -2355,7 +2323,7 @@
               </a:spcBef>
             </a:pPr>
             <a:r>
-              <a:rPr lang="en-US" sz="2000" dirty="0" smtClean="0">
+              <a:rPr lang="en-US" sz="2000" dirty="0">
                 <a:latin typeface="+mn-lt" charset="0"/>
                 <a:ea typeface="+mn-ea" charset="0"/>
                 <a:cs typeface="+mn-ea" charset="0"/>
@@ -2363,7 +2331,7 @@
               <a:t>spell checker on numpy:</a:t>
             </a:r>
             <a:r>
-              <a:rPr lang="en-US" sz="2000" baseline="0" dirty="0" smtClean="0">
+              <a:rPr lang="en-US" sz="2000" baseline="0" dirty="0">
                 <a:latin typeface="+mn-lt" charset="0"/>
                 <a:ea typeface="+mn-ea" charset="0"/>
                 <a:cs typeface="+mn-ea" charset="0"/>
@@ -3415,23 +3383,23 @@
           <a:lstStyle/>
           <a:p>
             <a:r>
-              <a:rPr lang="pl-PL" dirty="0" smtClean="0"/>
+              <a:rPr lang="pl-PL" dirty="0"/>
               <a:t>m = </a:t>
             </a:r>
             <a:r>
-              <a:rPr lang="pl-PL" dirty="0" err="1" smtClean="0"/>
+              <a:rPr lang="pl-PL" dirty="0" err="1"/>
               <a:t>np.arange</a:t>
             </a:r>
             <a:r>
-              <a:rPr lang="pl-PL" dirty="0" smtClean="0"/>
+              <a:rPr lang="pl-PL" dirty="0"/>
               <a:t>(15).</a:t>
             </a:r>
             <a:r>
-              <a:rPr lang="pl-PL" dirty="0" err="1" smtClean="0"/>
+              <a:rPr lang="pl-PL" dirty="0" err="1"/>
               <a:t>reshape</a:t>
             </a:r>
             <a:r>
-              <a:rPr lang="pl-PL" dirty="0" smtClean="0"/>
+              <a:rPr lang="pl-PL" dirty="0"/>
               <a:t>((5,3))</a:t>
             </a:r>
             <a:endParaRPr lang="en-US" dirty="0"/>
@@ -3780,10 +3748,9 @@
           </a:lstStyle>
           <a:p>
             <a:r>
-              <a:rPr lang="en-US" smtClean="0"/>
+              <a:rPr lang="en-US"/>
               <a:t>Click to edit Master title style</a:t>
             </a:r>
-            <a:endParaRPr lang="en-US"/>
           </a:p>
         </p:txBody>
       </p:sp>
@@ -3845,10 +3812,9 @@
           </a:lstStyle>
           <a:p>
             <a:r>
-              <a:rPr lang="en-US" smtClean="0"/>
+              <a:rPr lang="en-US"/>
               <a:t>Click to edit Master subtitle style</a:t>
             </a:r>
-            <a:endParaRPr lang="en-US"/>
           </a:p>
         </p:txBody>
       </p:sp>
@@ -3869,7 +3835,7 @@
           <a:p>
             <a:fld id="{49788B37-C21A-5B49-AA3A-FF17C8E3A1E5}" type="datetimeFigureOut">
               <a:rPr lang="en-US" smtClean="0"/>
-              <a:t>10/7/16</a:t>
+              <a:t>6/24/19</a:t>
             </a:fld>
             <a:endParaRPr lang="en-US"/>
           </a:p>
@@ -3963,10 +3929,9 @@
           <a:lstStyle/>
           <a:p>
             <a:r>
-              <a:rPr lang="en-US" smtClean="0"/>
+              <a:rPr lang="en-US"/>
               <a:t>Click to edit Master title style</a:t>
             </a:r>
-            <a:endParaRPr lang="en-US"/>
           </a:p>
         </p:txBody>
       </p:sp>
@@ -3987,38 +3952,37 @@
           <a:p>
             <a:pPr lvl="0"/>
             <a:r>
-              <a:rPr lang="en-US" smtClean="0"/>
+              <a:rPr lang="en-US"/>
               <a:t>Click to edit Master text styles</a:t>
             </a:r>
           </a:p>
           <a:p>
             <a:pPr lvl="1"/>
             <a:r>
-              <a:rPr lang="en-US" smtClean="0"/>
+              <a:rPr lang="en-US"/>
               <a:t>Second level</a:t>
             </a:r>
           </a:p>
           <a:p>
             <a:pPr lvl="2"/>
             <a:r>
-              <a:rPr lang="en-US" smtClean="0"/>
+              <a:rPr lang="en-US"/>
               <a:t>Third level</a:t>
             </a:r>
           </a:p>
           <a:p>
             <a:pPr lvl="3"/>
             <a:r>
-              <a:rPr lang="en-US" smtClean="0"/>
+              <a:rPr lang="en-US"/>
               <a:t>Fourth level</a:t>
             </a:r>
           </a:p>
           <a:p>
             <a:pPr lvl="4"/>
             <a:r>
-              <a:rPr lang="en-US" smtClean="0"/>
+              <a:rPr lang="en-US"/>
               <a:t>Fifth level</a:t>
             </a:r>
-            <a:endParaRPr lang="en-US"/>
           </a:p>
         </p:txBody>
       </p:sp>
@@ -4039,7 +4003,7 @@
           <a:p>
             <a:fld id="{49788B37-C21A-5B49-AA3A-FF17C8E3A1E5}" type="datetimeFigureOut">
               <a:rPr lang="en-US" smtClean="0"/>
-              <a:t>10/7/16</a:t>
+              <a:t>6/24/19</a:t>
             </a:fld>
             <a:endParaRPr lang="en-US"/>
           </a:p>
@@ -4138,10 +4102,9 @@
           <a:lstStyle/>
           <a:p>
             <a:r>
-              <a:rPr lang="en-US" smtClean="0"/>
+              <a:rPr lang="en-US"/>
               <a:t>Click to edit Master title style</a:t>
             </a:r>
-            <a:endParaRPr lang="en-US"/>
           </a:p>
         </p:txBody>
       </p:sp>
@@ -4167,38 +4130,37 @@
           <a:p>
             <a:pPr lvl="0"/>
             <a:r>
-              <a:rPr lang="en-US" smtClean="0"/>
+              <a:rPr lang="en-US"/>
               <a:t>Click to edit Master text styles</a:t>
             </a:r>
           </a:p>
           <a:p>
             <a:pPr lvl="1"/>
             <a:r>
-              <a:rPr lang="en-US" smtClean="0"/>
+              <a:rPr lang="en-US"/>
               <a:t>Second level</a:t>
             </a:r>
           </a:p>
           <a:p>
             <a:pPr lvl="2"/>
             <a:r>
-              <a:rPr lang="en-US" smtClean="0"/>
+              <a:rPr lang="en-US"/>
               <a:t>Third level</a:t>
             </a:r>
           </a:p>
           <a:p>
             <a:pPr lvl="3"/>
             <a:r>
-              <a:rPr lang="en-US" smtClean="0"/>
+              <a:rPr lang="en-US"/>
               <a:t>Fourth level</a:t>
             </a:r>
           </a:p>
           <a:p>
             <a:pPr lvl="4"/>
             <a:r>
-              <a:rPr lang="en-US" smtClean="0"/>
+              <a:rPr lang="en-US"/>
               <a:t>Fifth level</a:t>
             </a:r>
-            <a:endParaRPr lang="en-US"/>
           </a:p>
         </p:txBody>
       </p:sp>
@@ -4219,7 +4181,7 @@
           <a:p>
             <a:fld id="{49788B37-C21A-5B49-AA3A-FF17C8E3A1E5}" type="datetimeFigureOut">
               <a:rPr lang="en-US" smtClean="0"/>
-              <a:t>10/7/16</a:t>
+              <a:t>6/24/19</a:t>
             </a:fld>
             <a:endParaRPr lang="en-US"/>
           </a:p>
@@ -4313,10 +4275,9 @@
           <a:lstStyle/>
           <a:p>
             <a:r>
-              <a:rPr lang="en-US" smtClean="0"/>
+              <a:rPr lang="en-US"/>
               <a:t>Click to edit Master title style</a:t>
             </a:r>
-            <a:endParaRPr lang="en-US"/>
           </a:p>
         </p:txBody>
       </p:sp>
@@ -4337,38 +4298,37 @@
           <a:p>
             <a:pPr lvl="0"/>
             <a:r>
-              <a:rPr lang="en-US" smtClean="0"/>
+              <a:rPr lang="en-US"/>
               <a:t>Click to edit Master text styles</a:t>
             </a:r>
           </a:p>
           <a:p>
             <a:pPr lvl="1"/>
             <a:r>
-              <a:rPr lang="en-US" smtClean="0"/>
+              <a:rPr lang="en-US"/>
               <a:t>Second level</a:t>
             </a:r>
           </a:p>
           <a:p>
             <a:pPr lvl="2"/>
             <a:r>
-              <a:rPr lang="en-US" smtClean="0"/>
+              <a:rPr lang="en-US"/>
               <a:t>Third level</a:t>
             </a:r>
           </a:p>
           <a:p>
             <a:pPr lvl="3"/>
             <a:r>
-              <a:rPr lang="en-US" smtClean="0"/>
+              <a:rPr lang="en-US"/>
               <a:t>Fourth level</a:t>
             </a:r>
           </a:p>
           <a:p>
             <a:pPr lvl="4"/>
             <a:r>
-              <a:rPr lang="en-US" smtClean="0"/>
+              <a:rPr lang="en-US"/>
               <a:t>Fifth level</a:t>
             </a:r>
-            <a:endParaRPr lang="en-US"/>
           </a:p>
         </p:txBody>
       </p:sp>
@@ -4389,7 +4349,7 @@
           <a:p>
             <a:fld id="{49788B37-C21A-5B49-AA3A-FF17C8E3A1E5}" type="datetimeFigureOut">
               <a:rPr lang="en-US" smtClean="0"/>
-              <a:t>10/7/16</a:t>
+              <a:t>6/24/19</a:t>
             </a:fld>
             <a:endParaRPr lang="en-US"/>
           </a:p>
@@ -4492,10 +4452,9 @@
           </a:lstStyle>
           <a:p>
             <a:r>
-              <a:rPr lang="en-US" smtClean="0"/>
+              <a:rPr lang="en-US"/>
               <a:t>Click to edit Master title style</a:t>
             </a:r>
-            <a:endParaRPr lang="en-US"/>
           </a:p>
         </p:txBody>
       </p:sp>
@@ -4612,7 +4571,7 @@
           <a:p>
             <a:pPr lvl="0"/>
             <a:r>
-              <a:rPr lang="en-US" smtClean="0"/>
+              <a:rPr lang="en-US"/>
               <a:t>Click to edit Master text styles</a:t>
             </a:r>
           </a:p>
@@ -4635,7 +4594,7 @@
           <a:p>
             <a:fld id="{49788B37-C21A-5B49-AA3A-FF17C8E3A1E5}" type="datetimeFigureOut">
               <a:rPr lang="en-US" smtClean="0"/>
-              <a:t>10/7/16</a:t>
+              <a:t>6/24/19</a:t>
             </a:fld>
             <a:endParaRPr lang="en-US"/>
           </a:p>
@@ -4729,10 +4688,9 @@
           <a:lstStyle/>
           <a:p>
             <a:r>
-              <a:rPr lang="en-US" smtClean="0"/>
+              <a:rPr lang="en-US"/>
               <a:t>Click to edit Master title style</a:t>
             </a:r>
-            <a:endParaRPr lang="en-US"/>
           </a:p>
         </p:txBody>
       </p:sp>
@@ -4758,38 +4716,37 @@
           <a:p>
             <a:pPr lvl="0"/>
             <a:r>
-              <a:rPr lang="en-US" smtClean="0"/>
+              <a:rPr lang="en-US"/>
               <a:t>Click to edit Master text styles</a:t>
             </a:r>
           </a:p>
           <a:p>
             <a:pPr lvl="1"/>
             <a:r>
-              <a:rPr lang="en-US" smtClean="0"/>
+              <a:rPr lang="en-US"/>
               <a:t>Second level</a:t>
             </a:r>
           </a:p>
           <a:p>
             <a:pPr lvl="2"/>
             <a:r>
-              <a:rPr lang="en-US" smtClean="0"/>
+              <a:rPr lang="en-US"/>
               <a:t>Third level</a:t>
             </a:r>
           </a:p>
           <a:p>
             <a:pPr lvl="3"/>
             <a:r>
-              <a:rPr lang="en-US" smtClean="0"/>
+              <a:rPr lang="en-US"/>
               <a:t>Fourth level</a:t>
             </a:r>
           </a:p>
           <a:p>
             <a:pPr lvl="4"/>
             <a:r>
-              <a:rPr lang="en-US" smtClean="0"/>
+              <a:rPr lang="en-US"/>
               <a:t>Fifth level</a:t>
             </a:r>
-            <a:endParaRPr lang="en-US"/>
           </a:p>
         </p:txBody>
       </p:sp>
@@ -4815,38 +4772,37 @@
           <a:p>
             <a:pPr lvl="0"/>
             <a:r>
-              <a:rPr lang="en-US" smtClean="0"/>
+              <a:rPr lang="en-US"/>
               <a:t>Click to edit Master text styles</a:t>
             </a:r>
           </a:p>
           <a:p>
             <a:pPr lvl="1"/>
             <a:r>
-              <a:rPr lang="en-US" smtClean="0"/>
+              <a:rPr lang="en-US"/>
               <a:t>Second level</a:t>
             </a:r>
           </a:p>
           <a:p>
             <a:pPr lvl="2"/>
             <a:r>
-              <a:rPr lang="en-US" smtClean="0"/>
+              <a:rPr lang="en-US"/>
               <a:t>Third level</a:t>
             </a:r>
           </a:p>
           <a:p>
             <a:pPr lvl="3"/>
             <a:r>
-              <a:rPr lang="en-US" smtClean="0"/>
+              <a:rPr lang="en-US"/>
               <a:t>Fourth level</a:t>
             </a:r>
           </a:p>
           <a:p>
             <a:pPr lvl="4"/>
             <a:r>
-              <a:rPr lang="en-US" smtClean="0"/>
+              <a:rPr lang="en-US"/>
               <a:t>Fifth level</a:t>
             </a:r>
-            <a:endParaRPr lang="en-US"/>
           </a:p>
         </p:txBody>
       </p:sp>
@@ -4867,7 +4823,7 @@
           <a:p>
             <a:fld id="{49788B37-C21A-5B49-AA3A-FF17C8E3A1E5}" type="datetimeFigureOut">
               <a:rPr lang="en-US" smtClean="0"/>
-              <a:t>10/7/16</a:t>
+              <a:t>6/24/19</a:t>
             </a:fld>
             <a:endParaRPr lang="en-US"/>
           </a:p>
@@ -4966,10 +4922,9 @@
           <a:lstStyle/>
           <a:p>
             <a:r>
-              <a:rPr lang="en-US" smtClean="0"/>
+              <a:rPr lang="en-US"/>
               <a:t>Click to edit Master title style</a:t>
             </a:r>
-            <a:endParaRPr lang="en-US"/>
           </a:p>
         </p:txBody>
       </p:sp>
@@ -5032,7 +4987,7 @@
           <a:p>
             <a:pPr lvl="0"/>
             <a:r>
-              <a:rPr lang="en-US" smtClean="0"/>
+              <a:rPr lang="en-US"/>
               <a:t>Click to edit Master text styles</a:t>
             </a:r>
           </a:p>
@@ -5060,38 +5015,37 @@
           <a:p>
             <a:pPr lvl="0"/>
             <a:r>
-              <a:rPr lang="en-US" smtClean="0"/>
+              <a:rPr lang="en-US"/>
               <a:t>Click to edit Master text styles</a:t>
             </a:r>
           </a:p>
           <a:p>
             <a:pPr lvl="1"/>
             <a:r>
-              <a:rPr lang="en-US" smtClean="0"/>
+              <a:rPr lang="en-US"/>
               <a:t>Second level</a:t>
             </a:r>
           </a:p>
           <a:p>
             <a:pPr lvl="2"/>
             <a:r>
-              <a:rPr lang="en-US" smtClean="0"/>
+              <a:rPr lang="en-US"/>
               <a:t>Third level</a:t>
             </a:r>
           </a:p>
           <a:p>
             <a:pPr lvl="3"/>
             <a:r>
-              <a:rPr lang="en-US" smtClean="0"/>
+              <a:rPr lang="en-US"/>
               <a:t>Fourth level</a:t>
             </a:r>
           </a:p>
           <a:p>
             <a:pPr lvl="4"/>
             <a:r>
-              <a:rPr lang="en-US" smtClean="0"/>
+              <a:rPr lang="en-US"/>
               <a:t>Fifth level</a:t>
             </a:r>
-            <a:endParaRPr lang="en-US"/>
           </a:p>
         </p:txBody>
       </p:sp>
@@ -5154,7 +5108,7 @@
           <a:p>
             <a:pPr lvl="0"/>
             <a:r>
-              <a:rPr lang="en-US" smtClean="0"/>
+              <a:rPr lang="en-US"/>
               <a:t>Click to edit Master text styles</a:t>
             </a:r>
           </a:p>
@@ -5182,38 +5136,37 @@
           <a:p>
             <a:pPr lvl="0"/>
             <a:r>
-              <a:rPr lang="en-US" smtClean="0"/>
+              <a:rPr lang="en-US"/>
               <a:t>Click to edit Master text styles</a:t>
             </a:r>
           </a:p>
           <a:p>
             <a:pPr lvl="1"/>
             <a:r>
-              <a:rPr lang="en-US" smtClean="0"/>
+              <a:rPr lang="en-US"/>
               <a:t>Second level</a:t>
             </a:r>
           </a:p>
           <a:p>
             <a:pPr lvl="2"/>
             <a:r>
-              <a:rPr lang="en-US" smtClean="0"/>
+              <a:rPr lang="en-US"/>
               <a:t>Third level</a:t>
             </a:r>
           </a:p>
           <a:p>
             <a:pPr lvl="3"/>
             <a:r>
-              <a:rPr lang="en-US" smtClean="0"/>
+              <a:rPr lang="en-US"/>
               <a:t>Fourth level</a:t>
             </a:r>
           </a:p>
           <a:p>
             <a:pPr lvl="4"/>
             <a:r>
-              <a:rPr lang="en-US" smtClean="0"/>
+              <a:rPr lang="en-US"/>
               <a:t>Fifth level</a:t>
             </a:r>
-            <a:endParaRPr lang="en-US"/>
           </a:p>
         </p:txBody>
       </p:sp>
@@ -5234,7 +5187,7 @@
           <a:p>
             <a:fld id="{49788B37-C21A-5B49-AA3A-FF17C8E3A1E5}" type="datetimeFigureOut">
               <a:rPr lang="en-US" smtClean="0"/>
-              <a:t>10/7/16</a:t>
+              <a:t>6/24/19</a:t>
             </a:fld>
             <a:endParaRPr lang="en-US"/>
           </a:p>
@@ -5328,10 +5281,9 @@
           <a:lstStyle/>
           <a:p>
             <a:r>
-              <a:rPr lang="en-US" smtClean="0"/>
+              <a:rPr lang="en-US"/>
               <a:t>Click to edit Master title style</a:t>
             </a:r>
-            <a:endParaRPr lang="en-US"/>
           </a:p>
         </p:txBody>
       </p:sp>
@@ -5352,7 +5304,7 @@
           <a:p>
             <a:fld id="{49788B37-C21A-5B49-AA3A-FF17C8E3A1E5}" type="datetimeFigureOut">
               <a:rPr lang="en-US" smtClean="0"/>
-              <a:t>10/7/16</a:t>
+              <a:t>6/24/19</a:t>
             </a:fld>
             <a:endParaRPr lang="en-US"/>
           </a:p>
@@ -5447,7 +5399,7 @@
           <a:p>
             <a:fld id="{49788B37-C21A-5B49-AA3A-FF17C8E3A1E5}" type="datetimeFigureOut">
               <a:rPr lang="en-US" smtClean="0"/>
-              <a:t>10/7/16</a:t>
+              <a:t>6/24/19</a:t>
             </a:fld>
             <a:endParaRPr lang="en-US"/>
           </a:p>
@@ -5550,10 +5502,9 @@
           </a:lstStyle>
           <a:p>
             <a:r>
-              <a:rPr lang="en-US" smtClean="0"/>
+              <a:rPr lang="en-US"/>
               <a:t>Click to edit Master title style</a:t>
             </a:r>
-            <a:endParaRPr lang="en-US"/>
           </a:p>
         </p:txBody>
       </p:sp>
@@ -5607,38 +5558,37 @@
           <a:p>
             <a:pPr lvl="0"/>
             <a:r>
-              <a:rPr lang="en-US" smtClean="0"/>
+              <a:rPr lang="en-US"/>
               <a:t>Click to edit Master text styles</a:t>
             </a:r>
           </a:p>
           <a:p>
             <a:pPr lvl="1"/>
             <a:r>
-              <a:rPr lang="en-US" smtClean="0"/>
+              <a:rPr lang="en-US"/>
               <a:t>Second level</a:t>
             </a:r>
           </a:p>
           <a:p>
             <a:pPr lvl="2"/>
             <a:r>
-              <a:rPr lang="en-US" smtClean="0"/>
+              <a:rPr lang="en-US"/>
               <a:t>Third level</a:t>
             </a:r>
           </a:p>
           <a:p>
             <a:pPr lvl="3"/>
             <a:r>
-              <a:rPr lang="en-US" smtClean="0"/>
+              <a:rPr lang="en-US"/>
               <a:t>Fourth level</a:t>
             </a:r>
           </a:p>
           <a:p>
             <a:pPr lvl="4"/>
             <a:r>
-              <a:rPr lang="en-US" smtClean="0"/>
+              <a:rPr lang="en-US"/>
               <a:t>Fifth level</a:t>
             </a:r>
-            <a:endParaRPr lang="en-US"/>
           </a:p>
         </p:txBody>
       </p:sp>
@@ -5701,7 +5651,7 @@
           <a:p>
             <a:pPr lvl="0"/>
             <a:r>
-              <a:rPr lang="en-US" smtClean="0"/>
+              <a:rPr lang="en-US"/>
               <a:t>Click to edit Master text styles</a:t>
             </a:r>
           </a:p>
@@ -5724,7 +5674,7 @@
           <a:p>
             <a:fld id="{49788B37-C21A-5B49-AA3A-FF17C8E3A1E5}" type="datetimeFigureOut">
               <a:rPr lang="en-US" smtClean="0"/>
-              <a:t>10/7/16</a:t>
+              <a:t>6/24/19</a:t>
             </a:fld>
             <a:endParaRPr lang="en-US"/>
           </a:p>
@@ -5827,10 +5777,9 @@
           </a:lstStyle>
           <a:p>
             <a:r>
-              <a:rPr lang="en-US" smtClean="0"/>
+              <a:rPr lang="en-US"/>
               <a:t>Click to edit Master title style</a:t>
             </a:r>
-            <a:endParaRPr lang="en-US"/>
           </a:p>
         </p:txBody>
       </p:sp>
@@ -5954,7 +5903,7 @@
           <a:p>
             <a:pPr lvl="0"/>
             <a:r>
-              <a:rPr lang="en-US" smtClean="0"/>
+              <a:rPr lang="en-US"/>
               <a:t>Click to edit Master text styles</a:t>
             </a:r>
           </a:p>
@@ -5977,7 +5926,7 @@
           <a:p>
             <a:fld id="{49788B37-C21A-5B49-AA3A-FF17C8E3A1E5}" type="datetimeFigureOut">
               <a:rPr lang="en-US" smtClean="0"/>
-              <a:t>10/7/16</a:t>
+              <a:t>6/24/19</a:t>
             </a:fld>
             <a:endParaRPr lang="en-US"/>
           </a:p>
@@ -6086,10 +6035,9 @@
           <a:lstStyle/>
           <a:p>
             <a:r>
-              <a:rPr lang="en-US" smtClean="0"/>
+              <a:rPr lang="en-US"/>
               <a:t>Click to edit Master title style</a:t>
             </a:r>
-            <a:endParaRPr lang="en-US"/>
           </a:p>
         </p:txBody>
       </p:sp>
@@ -6120,38 +6068,37 @@
           <a:p>
             <a:pPr lvl="0"/>
             <a:r>
-              <a:rPr lang="en-US" smtClean="0"/>
+              <a:rPr lang="en-US"/>
               <a:t>Click to edit Master text styles</a:t>
             </a:r>
           </a:p>
           <a:p>
             <a:pPr lvl="1"/>
             <a:r>
-              <a:rPr lang="en-US" smtClean="0"/>
+              <a:rPr lang="en-US"/>
               <a:t>Second level</a:t>
             </a:r>
           </a:p>
           <a:p>
             <a:pPr lvl="2"/>
             <a:r>
-              <a:rPr lang="en-US" smtClean="0"/>
+              <a:rPr lang="en-US"/>
               <a:t>Third level</a:t>
             </a:r>
           </a:p>
           <a:p>
             <a:pPr lvl="3"/>
             <a:r>
-              <a:rPr lang="en-US" smtClean="0"/>
+              <a:rPr lang="en-US"/>
               <a:t>Fourth level</a:t>
             </a:r>
           </a:p>
           <a:p>
             <a:pPr lvl="4"/>
             <a:r>
-              <a:rPr lang="en-US" smtClean="0"/>
+              <a:rPr lang="en-US"/>
               <a:t>Fifth level</a:t>
             </a:r>
-            <a:endParaRPr lang="en-US"/>
           </a:p>
         </p:txBody>
       </p:sp>
@@ -6190,7 +6137,7 @@
           <a:p>
             <a:fld id="{49788B37-C21A-5B49-AA3A-FF17C8E3A1E5}" type="datetimeFigureOut">
               <a:rPr lang="en-US" smtClean="0"/>
-              <a:t>10/7/16</a:t>
+              <a:t>6/24/19</a:t>
             </a:fld>
             <a:endParaRPr lang="en-US"/>
           </a:p>
@@ -6616,28 +6563,27 @@
           <a:lstStyle/>
           <a:p>
             <a:r>
-              <a:rPr lang="en-US" dirty="0" err="1" smtClean="0"/>
+              <a:rPr lang="en-US" dirty="0" err="1"/>
               <a:t>Numpy</a:t>
             </a:r>
             <a:r>
-              <a:rPr lang="en-US" dirty="0" smtClean="0"/>
+              <a:rPr lang="en-US" dirty="0"/>
               <a:t>, Pandas,</a:t>
             </a:r>
             <a:br>
-              <a:rPr lang="en-US" dirty="0" smtClean="0"/>
+              <a:rPr lang="en-US" dirty="0"/>
             </a:br>
             <a:r>
-              <a:rPr lang="en-US" dirty="0" smtClean="0"/>
+              <a:rPr lang="en-US" dirty="0"/>
               <a:t>&amp;</a:t>
             </a:r>
             <a:br>
-              <a:rPr lang="en-US" dirty="0" smtClean="0"/>
+              <a:rPr lang="en-US" dirty="0"/>
             </a:br>
             <a:r>
-              <a:rPr lang="en-US" dirty="0" smtClean="0"/>
+              <a:rPr lang="en-US" dirty="0"/>
               <a:t>Dow Jones Industrial Index</a:t>
             </a:r>
-            <a:endParaRPr lang="en-US" dirty="0"/>
           </a:p>
         </p:txBody>
       </p:sp>
@@ -6651,13 +6597,6 @@
   <p:clrMapOvr>
     <a:masterClrMapping/>
   </p:clrMapOvr>
-  <p:timing>
-    <p:tnLst>
-      <p:par>
-        <p:cTn id="1" dur="indefinite" restart="never" nodeType="tmRoot"/>
-      </p:par>
-    </p:tnLst>
-  </p:timing>
 </p:sld>
 </file>
 
@@ -7754,14 +7693,13 @@
           <a:lstStyle/>
           <a:p>
             <a:r>
-              <a:rPr lang="en-US" dirty="0" err="1" smtClean="0"/>
+              <a:rPr lang="en-US" dirty="0" err="1"/>
               <a:t>NumPy</a:t>
             </a:r>
             <a:r>
-              <a:rPr lang="en-US" dirty="0" smtClean="0"/>
+              <a:rPr lang="en-US" dirty="0"/>
               <a:t> arrays versus Python lists</a:t>
             </a:r>
-            <a:endParaRPr lang="en-US" dirty="0"/>
           </a:p>
         </p:txBody>
       </p:sp>
@@ -7788,14 +7726,14 @@
           <a:lstStyle/>
           <a:p>
             <a:r>
-              <a:rPr lang="en-US" dirty="0" smtClean="0"/>
+              <a:rPr lang="en-US" dirty="0"/>
               <a:t>Python lists: Very general</a:t>
             </a:r>
           </a:p>
           <a:p>
             <a:pPr lvl="1"/>
             <a:r>
-              <a:rPr lang="en-US" dirty="0" smtClean="0">
+              <a:rPr lang="en-US" dirty="0">
                 <a:latin typeface="Courier New" pitchFamily="49" charset="0"/>
                 <a:cs typeface="Courier New" pitchFamily="49" charset="0"/>
               </a:rPr>
@@ -7805,7 +7743,7 @@
           <a:p>
             <a:pPr lvl="1"/>
             <a:r>
-              <a:rPr lang="en-US" dirty="0" smtClean="0">
+              <a:rPr lang="en-US" dirty="0">
                 <a:latin typeface="Courier New" pitchFamily="49" charset="0"/>
                 <a:cs typeface="Courier New" pitchFamily="49" charset="0"/>
               </a:rPr>
@@ -7815,7 +7753,7 @@
           <a:p>
             <a:pPr lvl="1"/>
             <a:r>
-              <a:rPr lang="en-US" dirty="0" smtClean="0">
+              <a:rPr lang="en-US" dirty="0">
                 <a:latin typeface="Courier New" pitchFamily="49" charset="0"/>
                 <a:cs typeface="Courier New" pitchFamily="49" charset="0"/>
               </a:rPr>
@@ -7824,18 +7762,18 @@
           </a:p>
           <a:p>
             <a:r>
-              <a:rPr lang="en-US" dirty="0" err="1" smtClean="0"/>
+              <a:rPr lang="en-US" dirty="0" err="1"/>
               <a:t>NumPy</a:t>
             </a:r>
             <a:r>
-              <a:rPr lang="en-US" dirty="0" smtClean="0"/>
+              <a:rPr lang="en-US" dirty="0"/>
               <a:t> arrays:</a:t>
             </a:r>
           </a:p>
           <a:p>
             <a:pPr lvl="1"/>
             <a:r>
-              <a:rPr lang="en-US" dirty="0" smtClean="0">
+              <a:rPr lang="en-US" dirty="0">
                 <a:latin typeface="Courier New" pitchFamily="49" charset="0"/>
                 <a:cs typeface="Courier New" pitchFamily="49" charset="0"/>
               </a:rPr>
@@ -7845,7 +7783,7 @@
           <a:p>
             <a:pPr lvl="1"/>
             <a:r>
-              <a:rPr lang="en-US" dirty="0" smtClean="0">
+              <a:rPr lang="en-US" dirty="0">
                 <a:latin typeface="Courier New" pitchFamily="49" charset="0"/>
                 <a:cs typeface="Courier New" pitchFamily="49" charset="0"/>
               </a:rPr>
@@ -7855,17 +7793,16 @@
           <a:p>
             <a:pPr lvl="1"/>
             <a:r>
-              <a:rPr lang="en-US" dirty="0" smtClean="0"/>
+              <a:rPr lang="en-US" dirty="0"/>
               <a:t>All rows must have same length, etc.</a:t>
             </a:r>
           </a:p>
           <a:p>
             <a:pPr lvl="1"/>
             <a:r>
-              <a:rPr lang="en-US" dirty="0" smtClean="0"/>
+              <a:rPr lang="en-US" dirty="0"/>
               <a:t>All entries must have same data-type, e.g. all real or all complex</a:t>
             </a:r>
-            <a:endParaRPr lang="en-US" dirty="0"/>
           </a:p>
         </p:txBody>
       </p:sp>
@@ -7948,7 +7885,7 @@
               </a:tabLst>
             </a:pPr>
             <a:r>
-              <a:rPr lang="en-US" sz="4400" dirty="0" smtClean="0">
+              <a:rPr lang="en-US" sz="4400" dirty="0">
                 <a:solidFill>
                   <a:srgbClr val="000000"/>
                 </a:solidFill>
@@ -7958,14 +7895,6 @@
               </a:rPr>
               <a:t>Create 1-D Array</a:t>
             </a:r>
-            <a:endParaRPr lang="en-US" sz="4400" dirty="0">
-              <a:solidFill>
-                <a:srgbClr val="000000"/>
-              </a:solidFill>
-              <a:latin typeface="Calibri" charset="0"/>
-              <a:ea typeface="DejaVu LGC Sans" charset="0"/>
-              <a:cs typeface="DejaVu LGC Sans" charset="0"/>
-            </a:endParaRPr>
           </a:p>
         </p:txBody>
       </p:sp>
@@ -8106,7 +8035,7 @@
               </a:tabLst>
             </a:pPr>
             <a:r>
-              <a:rPr lang="en-US" sz="4400" dirty="0" smtClean="0">
+              <a:rPr lang="en-US" sz="4400" dirty="0">
                 <a:solidFill>
                   <a:srgbClr val="000000"/>
                 </a:solidFill>
@@ -8116,14 +8045,6 @@
               </a:rPr>
               <a:t>Create 2-D Matrix</a:t>
             </a:r>
-            <a:endParaRPr lang="en-US" sz="4400" dirty="0">
-              <a:solidFill>
-                <a:srgbClr val="000000"/>
-              </a:solidFill>
-              <a:latin typeface="Calibri" charset="0"/>
-              <a:ea typeface="DejaVu LGC Sans" charset="0"/>
-              <a:cs typeface="DejaVu LGC Sans" charset="0"/>
-            </a:endParaRPr>
           </a:p>
         </p:txBody>
       </p:sp>
@@ -8231,10 +8152,9 @@
           <a:lstStyle/>
           <a:p>
             <a:r>
-              <a:rPr lang="en-US" b="1" dirty="0" smtClean="0"/>
+              <a:rPr lang="en-US" b="1" dirty="0"/>
               <a:t>Group Exercise</a:t>
             </a:r>
-            <a:endParaRPr lang="en-US" b="1" dirty="0"/>
           </a:p>
         </p:txBody>
       </p:sp>
@@ -8262,15 +8182,15 @@
               <a:buNone/>
             </a:pPr>
             <a:r>
-              <a:rPr lang="en-US" dirty="0" smtClean="0"/>
+              <a:rPr lang="en-US" dirty="0"/>
               <a:t>Create a (5, 3) 2-d array / matrix with </a:t>
             </a:r>
             <a:r>
-              <a:rPr lang="en-US" dirty="0" err="1" smtClean="0"/>
+              <a:rPr lang="en-US" dirty="0" err="1"/>
               <a:t>Numpy</a:t>
             </a:r>
             <a:r>
-              <a:rPr lang="en-US" dirty="0" smtClean="0"/>
+              <a:rPr lang="en-US" dirty="0"/>
               <a:t> that looks like the following:</a:t>
             </a:r>
           </a:p>
@@ -8497,10 +8417,9 @@
               <a:buNone/>
             </a:pPr>
             <a:r>
-              <a:rPr lang="en-US" dirty="0" smtClean="0"/>
+              <a:rPr lang="en-US" dirty="0"/>
               <a:t>Challenge: do it in 1 line</a:t>
             </a:r>
-            <a:endParaRPr lang="en-US" dirty="0"/>
           </a:p>
         </p:txBody>
       </p:sp>
@@ -10176,14 +10095,13 @@
           <a:lstStyle/>
           <a:p>
             <a:r>
-              <a:rPr lang="en-US" dirty="0" err="1" smtClean="0"/>
+              <a:rPr lang="en-US" dirty="0" err="1"/>
               <a:t>Git</a:t>
             </a:r>
             <a:r>
-              <a:rPr lang="en-US" dirty="0" smtClean="0"/>
+              <a:rPr lang="en-US" dirty="0"/>
               <a:t> Update</a:t>
             </a:r>
-            <a:endParaRPr lang="en-US" dirty="0"/>
           </a:p>
         </p:txBody>
       </p:sp>
@@ -10203,163 +10121,135 @@
           <a:lstStyle/>
           <a:p>
             <a:r>
-              <a:rPr lang="en-US" dirty="0" smtClean="0"/>
+              <a:rPr lang="en-US" dirty="0"/>
               <a:t>First time</a:t>
             </a:r>
             <a:br>
-              <a:rPr lang="en-US" dirty="0" smtClean="0"/>
+              <a:rPr lang="en-US" dirty="0"/>
             </a:br>
-            <a:r>
-              <a:rPr lang="en-US" dirty="0" smtClean="0"/>
-              <a:t/>
-            </a:r>
             <a:br>
-              <a:rPr lang="en-US" dirty="0" smtClean="0"/>
+              <a:rPr lang="en-US" dirty="0"/>
             </a:br>
             <a:r>
-              <a:rPr lang="en-US" sz="2200" dirty="0" err="1" smtClean="0">
+              <a:rPr lang="en-US" sz="2200" dirty="0">
                 <a:latin typeface="Courier New" charset="0"/>
                 <a:ea typeface="Courier New" charset="0"/>
                 <a:cs typeface="Courier New" charset="0"/>
               </a:rPr>
-              <a:t>git</a:t>
-            </a:r>
-            <a:r>
-              <a:rPr lang="en-US" sz="2200" dirty="0" smtClean="0">
+              <a:t>git clone https://</a:t>
+            </a:r>
+            <a:r>
+              <a:rPr lang="en-US" sz="2200" dirty="0" err="1">
                 <a:latin typeface="Courier New" charset="0"/>
                 <a:ea typeface="Courier New" charset="0"/>
                 <a:cs typeface="Courier New" charset="0"/>
               </a:rPr>
-              <a:t> clone https://</a:t>
-            </a:r>
-            <a:r>
-              <a:rPr lang="en-US" sz="2200" dirty="0" err="1" smtClean="0">
+              <a:t>github.com</a:t>
+            </a:r>
+            <a:r>
+              <a:rPr lang="en-US" sz="2200" dirty="0">
                 <a:latin typeface="Courier New" charset="0"/>
                 <a:ea typeface="Courier New" charset="0"/>
                 <a:cs typeface="Courier New" charset="0"/>
               </a:rPr>
-              <a:t>github.com</a:t>
-            </a:r>
-            <a:r>
-              <a:rPr lang="en-US" sz="2200" dirty="0" smtClean="0">
+              <a:t>/</a:t>
+            </a:r>
+            <a:r>
+              <a:rPr lang="en-US" sz="2200" dirty="0" err="1">
                 <a:latin typeface="Courier New" charset="0"/>
                 <a:ea typeface="Courier New" charset="0"/>
                 <a:cs typeface="Courier New" charset="0"/>
               </a:rPr>
-              <a:t>/</a:t>
-            </a:r>
-            <a:r>
-              <a:rPr lang="en-US" sz="2200" dirty="0" err="1" smtClean="0">
+              <a:t>philmui</a:t>
+            </a:r>
+            <a:r>
+              <a:rPr lang="en-US" sz="2200">
                 <a:latin typeface="Courier New" charset="0"/>
                 <a:ea typeface="Courier New" charset="0"/>
                 <a:cs typeface="Courier New" charset="0"/>
               </a:rPr>
-              <a:t>philmui</a:t>
-            </a:r>
-            <a:r>
-              <a:rPr lang="en-US" sz="2200" dirty="0" smtClean="0">
+              <a:t>/algorithmic-bias-2019</a:t>
+            </a:r>
+            <a:br>
+              <a:rPr lang="en-US" dirty="0"/>
+            </a:br>
+            <a:endParaRPr lang="en-US" dirty="0"/>
+          </a:p>
+          <a:p>
+            <a:r>
+              <a:rPr lang="en-US" dirty="0"/>
+              <a:t>All subsequent times (if you are not retaining any of your changes):</a:t>
+            </a:r>
+            <a:br>
+              <a:rPr lang="en-US" dirty="0"/>
+            </a:br>
+            <a:br>
+              <a:rPr lang="en-US" dirty="0"/>
+            </a:br>
+            <a:r>
+              <a:rPr lang="en-US" sz="2200" dirty="0" err="1">
                 <a:latin typeface="Courier New" charset="0"/>
                 <a:ea typeface="Courier New" charset="0"/>
                 <a:cs typeface="Courier New" charset="0"/>
               </a:rPr>
-              <a:t>/datascience2016fall</a:t>
-            </a:r>
-            <a:r>
-              <a:rPr lang="en-US" dirty="0" smtClean="0"/>
-              <a:t/>
-            </a:r>
-            <a:br>
-              <a:rPr lang="en-US" dirty="0" smtClean="0"/>
-            </a:br>
-            <a:endParaRPr lang="en-US" dirty="0" smtClean="0"/>
-          </a:p>
-          <a:p>
-            <a:r>
-              <a:rPr lang="en-US" dirty="0" smtClean="0"/>
-              <a:t>All subsequent times (if you are not retaining any of your changes):</a:t>
-            </a:r>
-            <a:br>
-              <a:rPr lang="en-US" dirty="0" smtClean="0"/>
-            </a:br>
-            <a:r>
-              <a:rPr lang="en-US" dirty="0" smtClean="0"/>
-              <a:t/>
-            </a:r>
-            <a:br>
-              <a:rPr lang="en-US" dirty="0" smtClean="0"/>
-            </a:br>
-            <a:r>
-              <a:rPr lang="en-US" sz="2200" dirty="0" err="1" smtClean="0">
+              <a:t>git</a:t>
+            </a:r>
+            <a:r>
+              <a:rPr lang="en-US" sz="2200" dirty="0">
                 <a:latin typeface="Courier New" charset="0"/>
                 <a:ea typeface="Courier New" charset="0"/>
                 <a:cs typeface="Courier New" charset="0"/>
               </a:rPr>
-              <a:t>git</a:t>
-            </a:r>
-            <a:r>
-              <a:rPr lang="en-US" sz="2200" dirty="0" smtClean="0">
+              <a:t> clean --</a:t>
+            </a:r>
+            <a:r>
+              <a:rPr lang="en-US" sz="2200" dirty="0" err="1">
                 <a:latin typeface="Courier New" charset="0"/>
                 <a:ea typeface="Courier New" charset="0"/>
                 <a:cs typeface="Courier New" charset="0"/>
               </a:rPr>
-              <a:t> clean --</a:t>
-            </a:r>
-            <a:r>
-              <a:rPr lang="en-US" sz="2200" dirty="0" err="1" smtClean="0">
+              <a:t>fd</a:t>
+            </a:r>
+            <a:br>
+              <a:rPr lang="en-US" sz="2200" dirty="0">
                 <a:latin typeface="Courier New" charset="0"/>
                 <a:ea typeface="Courier New" charset="0"/>
                 <a:cs typeface="Courier New" charset="0"/>
               </a:rPr>
-              <a:t>fd</a:t>
-            </a:r>
-            <a:r>
-              <a:rPr lang="en-US" sz="2200" dirty="0" smtClean="0">
+            </a:br>
+            <a:r>
+              <a:rPr lang="en-US" sz="2200" dirty="0" err="1">
                 <a:latin typeface="Courier New" charset="0"/>
                 <a:ea typeface="Courier New" charset="0"/>
                 <a:cs typeface="Courier New" charset="0"/>
               </a:rPr>
-              <a:t/>
-            </a:r>
-            <a:br>
-              <a:rPr lang="en-US" sz="2200" dirty="0" smtClean="0">
+              <a:t>git</a:t>
+            </a:r>
+            <a:r>
+              <a:rPr lang="en-US" sz="2200" dirty="0">
                 <a:latin typeface="Courier New" charset="0"/>
                 <a:ea typeface="Courier New" charset="0"/>
                 <a:cs typeface="Courier New" charset="0"/>
               </a:rPr>
-            </a:br>
-            <a:r>
-              <a:rPr lang="en-US" sz="2200" dirty="0" err="1" smtClean="0">
+              <a:t> reset --hard</a:t>
+            </a:r>
+            <a:br>
+              <a:rPr lang="en-US" sz="2200" dirty="0">
                 <a:latin typeface="Courier New" charset="0"/>
                 <a:ea typeface="Courier New" charset="0"/>
                 <a:cs typeface="Courier New" charset="0"/>
               </a:rPr>
-              <a:t>git</a:t>
-            </a:r>
-            <a:r>
-              <a:rPr lang="en-US" sz="2200" dirty="0" smtClean="0">
+            </a:br>
+            <a:r>
+              <a:rPr lang="en-US" sz="2200" dirty="0" err="1">
                 <a:latin typeface="Courier New" charset="0"/>
                 <a:ea typeface="Courier New" charset="0"/>
                 <a:cs typeface="Courier New" charset="0"/>
               </a:rPr>
-              <a:t> reset --hard</a:t>
-            </a:r>
-            <a:br>
-              <a:rPr lang="en-US" sz="2200" dirty="0" smtClean="0">
-                <a:latin typeface="Courier New" charset="0"/>
-                <a:ea typeface="Courier New" charset="0"/>
-                <a:cs typeface="Courier New" charset="0"/>
-              </a:rPr>
-            </a:br>
-            <a:r>
-              <a:rPr lang="en-US" sz="2200" dirty="0" err="1" smtClean="0">
-                <a:latin typeface="Courier New" charset="0"/>
-                <a:ea typeface="Courier New" charset="0"/>
-                <a:cs typeface="Courier New" charset="0"/>
-              </a:rPr>
               <a:t>git</a:t>
             </a:r>
             <a:r>
-              <a:rPr lang="en-US" sz="2200" dirty="0" smtClean="0">
+              <a:rPr lang="en-US" sz="2200" dirty="0">
                 <a:latin typeface="Courier New" charset="0"/>
                 <a:ea typeface="Courier New" charset="0"/>
                 <a:cs typeface="Courier New" charset="0"/>
@@ -13555,7 +13445,7 @@
               </a:tabLst>
             </a:pPr>
             <a:r>
-              <a:rPr lang="en-US" sz="4400" dirty="0" smtClean="0">
+              <a:rPr lang="en-US" sz="4400" dirty="0">
                 <a:solidFill>
                   <a:srgbClr val="000000"/>
                 </a:solidFill>
@@ -13563,18 +13453,7 @@
                 <a:ea typeface="DejaVu LGC Sans" charset="0"/>
                 <a:cs typeface="DejaVu LGC Sans" charset="0"/>
               </a:rPr>
-              <a:t>Array </a:t>
-            </a:r>
-            <a:r>
-              <a:rPr lang="en-US" sz="4400" dirty="0">
-                <a:solidFill>
-                  <a:srgbClr val="000000"/>
-                </a:solidFill>
-                <a:latin typeface="Calibri" charset="0"/>
-                <a:ea typeface="DejaVu LGC Sans" charset="0"/>
-                <a:cs typeface="DejaVu LGC Sans" charset="0"/>
-              </a:rPr>
-              <a:t>Slicing</a:t>
+              <a:t>Array Slicing</a:t>
             </a:r>
           </a:p>
         </p:txBody>
@@ -13939,40 +13818,18 @@
                 <a:ea typeface="DejaVu LGC Sans" charset="0"/>
                 <a:cs typeface="Courier"/>
               </a:rPr>
-              <a:t>a[:,2]   </a:t>
-            </a:r>
-            <a:r>
-              <a:rPr lang="en-US" sz="3200" dirty="0" smtClean="0">
-                <a:solidFill>
-                  <a:srgbClr val="000000"/>
-                </a:solidFill>
-                <a:latin typeface="Courier"/>
+              <a:t>a[:,2]     </a:t>
+            </a:r>
+            <a:r>
+              <a:rPr lang="en-US" sz="3200" dirty="0">
+                <a:solidFill>
+                  <a:srgbClr val="0000FF"/>
+                </a:solidFill>
+                <a:latin typeface="+mj-lt"/>
                 <a:ea typeface="DejaVu LGC Sans" charset="0"/>
                 <a:cs typeface="Courier"/>
               </a:rPr>
-              <a:t>  </a:t>
-            </a:r>
-            <a:r>
-              <a:rPr lang="en-US" sz="3200" dirty="0" smtClean="0">
-                <a:solidFill>
-                  <a:srgbClr val="0000FF"/>
-                </a:solidFill>
-                <a:latin typeface="+mj-lt"/>
-                <a:ea typeface="DejaVu LGC Sans" charset="0"/>
-                <a:cs typeface="Courier"/>
-              </a:rPr>
-              <a:t># </a:t>
-            </a:r>
-            <a:r>
-              <a:rPr lang="en-US" sz="3200" dirty="0">
-                <a:solidFill>
-                  <a:srgbClr val="0000FF"/>
-                </a:solidFill>
-                <a:latin typeface="+mj-lt"/>
-                <a:ea typeface="DejaVu LGC Sans" charset="0"/>
-                <a:cs typeface="Courier"/>
-              </a:rPr>
-              <a:t>all rows, column 2</a:t>
+              <a:t># all rows, column 2</a:t>
             </a:r>
           </a:p>
           <a:p>
@@ -14123,7 +13980,7 @@
               </a:tabLst>
             </a:pPr>
             <a:r>
-              <a:rPr lang="en-US" sz="4400" dirty="0" smtClean="0">
+              <a:rPr lang="en-US" sz="4400" dirty="0">
                 <a:solidFill>
                   <a:srgbClr val="000000"/>
                 </a:solidFill>
@@ -14131,18 +13988,7 @@
                 <a:ea typeface="DejaVu LGC Sans" charset="0"/>
                 <a:cs typeface="DejaVu LGC Sans" charset="0"/>
               </a:rPr>
-              <a:t>Array </a:t>
-            </a:r>
-            <a:r>
-              <a:rPr lang="en-US" sz="4400" dirty="0">
-                <a:solidFill>
-                  <a:srgbClr val="000000"/>
-                </a:solidFill>
-                <a:latin typeface="Calibri" charset="0"/>
-                <a:ea typeface="DejaVu LGC Sans" charset="0"/>
-                <a:cs typeface="DejaVu LGC Sans" charset="0"/>
-              </a:rPr>
-              <a:t>Slicing</a:t>
+              <a:t>Array Slicing</a:t>
             </a:r>
           </a:p>
         </p:txBody>
@@ -14978,10 +14824,9 @@
           <a:lstStyle/>
           <a:p>
             <a:r>
-              <a:rPr lang="en-US" dirty="0" smtClean="0"/>
+              <a:rPr lang="en-US" dirty="0"/>
               <a:t>Groups</a:t>
             </a:r>
-            <a:endParaRPr lang="en-US" dirty="0"/>
           </a:p>
         </p:txBody>
       </p:sp>
@@ -15001,17 +14846,17 @@
           <a:lstStyle/>
           <a:p>
             <a:r>
-              <a:rPr lang="en-US" dirty="0" smtClean="0"/>
+              <a:rPr lang="en-US" dirty="0"/>
               <a:t>Form groups of 4 students</a:t>
             </a:r>
           </a:p>
           <a:p>
             <a:r>
-              <a:rPr lang="en-US" dirty="0" smtClean="0"/>
+              <a:rPr lang="en-US" dirty="0"/>
               <a:t>Help everyone to be able to ”</a:t>
             </a:r>
             <a:r>
-              <a:rPr lang="en-US" dirty="0" err="1" smtClean="0">
+              <a:rPr lang="en-US" dirty="0" err="1">
                 <a:latin typeface="Courier New" charset="0"/>
                 <a:ea typeface="Courier New" charset="0"/>
                 <a:cs typeface="Courier New" charset="0"/>
@@ -15019,7 +14864,7 @@
               <a:t>git</a:t>
             </a:r>
             <a:r>
-              <a:rPr lang="en-US" dirty="0" smtClean="0">
+              <a:rPr lang="en-US" dirty="0">
                 <a:latin typeface="Courier New" charset="0"/>
                 <a:ea typeface="Courier New" charset="0"/>
                 <a:cs typeface="Courier New" charset="0"/>
@@ -15027,17 +14872,17 @@
               <a:t> fetch --all</a:t>
             </a:r>
             <a:r>
-              <a:rPr lang="en-US" dirty="0" smtClean="0"/>
+              <a:rPr lang="en-US" dirty="0"/>
               <a:t>” for their individual course repo</a:t>
             </a:r>
           </a:p>
           <a:p>
             <a:r>
-              <a:rPr lang="en-US" dirty="0" smtClean="0"/>
+              <a:rPr lang="en-US" dirty="0"/>
               <a:t>Help everyone in your group to run Lecture 02’s “</a:t>
             </a:r>
             <a:r>
-              <a:rPr lang="en-US" dirty="0" err="1" smtClean="0">
+              <a:rPr lang="en-US" dirty="0" err="1">
                 <a:latin typeface="Courier New" charset="0"/>
                 <a:ea typeface="Courier New" charset="0"/>
                 <a:cs typeface="Courier New" charset="0"/>
@@ -15045,7 +14890,7 @@
               <a:t>tweetering.py</a:t>
             </a:r>
             <a:r>
-              <a:rPr lang="en-US" dirty="0" smtClean="0"/>
+              <a:rPr lang="en-US" dirty="0"/>
               <a:t>” on all real-time tweets containing either:</a:t>
             </a:r>
           </a:p>
@@ -15055,11 +14900,11 @@
               <a:buChar char="⎯"/>
             </a:pPr>
             <a:r>
-              <a:rPr lang="en-US" dirty="0" smtClean="0"/>
+              <a:rPr lang="en-US" dirty="0"/>
               <a:t>“</a:t>
             </a:r>
             <a:r>
-              <a:rPr lang="en-US" dirty="0" smtClean="0">
+              <a:rPr lang="en-US" dirty="0">
                 <a:latin typeface="Courier New" charset="0"/>
                 <a:ea typeface="Courier New" charset="0"/>
                 <a:cs typeface="Courier New" charset="0"/>
@@ -15067,7 +14912,7 @@
               <a:t>trump</a:t>
             </a:r>
             <a:r>
-              <a:rPr lang="en-US" dirty="0" smtClean="0"/>
+              <a:rPr lang="en-US" dirty="0"/>
               <a:t>”</a:t>
             </a:r>
           </a:p>
@@ -15077,11 +14922,11 @@
               <a:buChar char="⎯"/>
             </a:pPr>
             <a:r>
-              <a:rPr lang="en-US" dirty="0" smtClean="0"/>
+              <a:rPr lang="en-US" dirty="0"/>
               <a:t>“</a:t>
             </a:r>
             <a:r>
-              <a:rPr lang="en-US" dirty="0" err="1" smtClean="0">
+              <a:rPr lang="en-US" dirty="0" err="1">
                 <a:latin typeface="Courier New" charset="0"/>
                 <a:ea typeface="Courier New" charset="0"/>
                 <a:cs typeface="Courier New" charset="0"/>
@@ -15089,7 +14934,7 @@
               <a:t>clinton</a:t>
             </a:r>
             <a:r>
-              <a:rPr lang="en-US" dirty="0" smtClean="0"/>
+              <a:rPr lang="en-US" dirty="0"/>
               <a:t>”</a:t>
             </a:r>
           </a:p>
@@ -15141,11 +14986,11 @@
           <a:lstStyle/>
           <a:p>
             <a:r>
-              <a:rPr lang="en-US" dirty="0" smtClean="0"/>
+              <a:rPr lang="en-US" dirty="0"/>
               <a:t>Conditional Logic with </a:t>
             </a:r>
             <a:r>
-              <a:rPr lang="en-US" dirty="0" err="1" smtClean="0"/>
+              <a:rPr lang="en-US" dirty="0" err="1"/>
               <a:t>NumPy</a:t>
             </a:r>
             <a:endParaRPr lang="en-US" dirty="0"/>
@@ -15192,10 +15037,9 @@
               <a:defRPr/>
             </a:pPr>
             <a:r>
-              <a:rPr lang="en-US" dirty="0" smtClean="0"/>
+              <a:rPr lang="en-US" dirty="0"/>
               <a:t>Consider these arrays:</a:t>
             </a:r>
-            <a:endParaRPr lang="en-US" dirty="0"/>
           </a:p>
         </p:txBody>
       </p:sp>
@@ -15426,10 +15270,9 @@
               <a:buNone/>
             </a:pPr>
             <a:r>
-              <a:rPr lang="en-US" dirty="0" smtClean="0"/>
+              <a:rPr lang="en-US" dirty="0"/>
               <a:t>Use native “list comprehension” from Python:</a:t>
             </a:r>
-            <a:endParaRPr lang="en-US" dirty="0"/>
           </a:p>
         </p:txBody>
       </p:sp>
@@ -15509,11 +15352,11 @@
           <a:lstStyle/>
           <a:p>
             <a:r>
-              <a:rPr lang="en-US" dirty="0" smtClean="0"/>
+              <a:rPr lang="en-US" dirty="0"/>
               <a:t>Conditional Logic with </a:t>
             </a:r>
             <a:r>
-              <a:rPr lang="en-US" dirty="0" err="1" smtClean="0"/>
+              <a:rPr lang="en-US" dirty="0" err="1"/>
               <a:t>NumPy</a:t>
             </a:r>
             <a:endParaRPr lang="en-US" dirty="0"/>
@@ -15560,10 +15403,9 @@
               <a:defRPr/>
             </a:pPr>
             <a:r>
-              <a:rPr lang="en-US" dirty="0" smtClean="0"/>
+              <a:rPr lang="en-US" dirty="0"/>
               <a:t>Consider these arrays:</a:t>
             </a:r>
-            <a:endParaRPr lang="en-US" dirty="0"/>
           </a:p>
         </p:txBody>
       </p:sp>
@@ -15794,18 +15636,17 @@
               <a:buNone/>
             </a:pPr>
             <a:r>
-              <a:rPr lang="en-US" dirty="0" smtClean="0"/>
+              <a:rPr lang="en-US" dirty="0"/>
               <a:t>Use </a:t>
             </a:r>
             <a:r>
-              <a:rPr lang="en-US" dirty="0" err="1" smtClean="0"/>
+              <a:rPr lang="en-US" dirty="0" err="1"/>
               <a:t>NumPy</a:t>
             </a:r>
             <a:r>
-              <a:rPr lang="en-US" dirty="0" smtClean="0"/>
+              <a:rPr lang="en-US" dirty="0"/>
               <a:t> conditional logic:</a:t>
             </a:r>
-            <a:endParaRPr lang="en-US" dirty="0"/>
           </a:p>
         </p:txBody>
       </p:sp>
@@ -15885,18 +15726,17 @@
           <a:lstStyle/>
           <a:p>
             <a:r>
-              <a:rPr lang="en-US" dirty="0" smtClean="0"/>
+              <a:rPr lang="en-US" dirty="0"/>
               <a:t>Why Conditional Logic with </a:t>
             </a:r>
             <a:r>
-              <a:rPr lang="en-US" dirty="0" err="1" smtClean="0"/>
+              <a:rPr lang="en-US" dirty="0" err="1"/>
               <a:t>NumPy</a:t>
             </a:r>
             <a:r>
-              <a:rPr lang="en-US" dirty="0" smtClean="0"/>
+              <a:rPr lang="en-US" dirty="0"/>
               <a:t>?</a:t>
             </a:r>
-            <a:endParaRPr lang="en-US" dirty="0"/>
           </a:p>
         </p:txBody>
       </p:sp>
@@ -15940,10 +15780,9 @@
               <a:defRPr/>
             </a:pPr>
             <a:r>
-              <a:rPr lang="en-US" dirty="0" smtClean="0"/>
+              <a:rPr lang="en-US" dirty="0"/>
               <a:t>Consider these arrays:</a:t>
             </a:r>
-            <a:endParaRPr lang="en-US" dirty="0"/>
           </a:p>
         </p:txBody>
       </p:sp>
@@ -16174,7 +16013,7 @@
               <a:buAutoNum type="arabicParenBoth"/>
             </a:pPr>
             <a:r>
-              <a:rPr lang="en-US" dirty="0" smtClean="0"/>
+              <a:rPr lang="en-US" dirty="0"/>
               <a:t>Works with vectors / arrays / list by default </a:t>
             </a:r>
           </a:p>
@@ -16190,7 +16029,7 @@
               <a:buAutoNum type="arabicParenBoth"/>
             </a:pPr>
             <a:r>
-              <a:rPr lang="en-US" dirty="0" smtClean="0"/>
+              <a:rPr lang="en-US" dirty="0"/>
               <a:t>Fast </a:t>
             </a:r>
           </a:p>
@@ -16219,13 +16058,6 @@
   <p:clrMapOvr>
     <a:masterClrMapping/>
   </p:clrMapOvr>
-  <p:timing>
-    <p:tnLst>
-      <p:par>
-        <p:cTn id="1" dur="indefinite" restart="never" nodeType="tmRoot"/>
-      </p:par>
-    </p:tnLst>
-  </p:timing>
 </p:sld>
 </file>
 
@@ -16262,10 +16094,9 @@
           <a:lstStyle/>
           <a:p>
             <a:r>
-              <a:rPr lang="en-US" b="1" dirty="0" smtClean="0"/>
+              <a:rPr lang="en-US" b="1" dirty="0"/>
               <a:t>EXERCISE</a:t>
             </a:r>
-            <a:endParaRPr lang="en-US" b="1" dirty="0"/>
           </a:p>
         </p:txBody>
       </p:sp>
@@ -16287,7 +16118,7 @@
             <a:pPr>
               <a:buNone/>
             </a:pPr>
-            <a:endParaRPr lang="en-US" dirty="0" smtClean="0"/>
+            <a:endParaRPr lang="en-US" dirty="0"/>
           </a:p>
         </p:txBody>
       </p:sp>
@@ -16337,10 +16168,9 @@
           <a:lstStyle/>
           <a:p>
             <a:r>
-              <a:rPr lang="en-US" dirty="0" smtClean="0"/>
+              <a:rPr lang="en-US" dirty="0"/>
               <a:t>Pandas</a:t>
             </a:r>
-            <a:endParaRPr lang="en-US" dirty="0"/>
           </a:p>
         </p:txBody>
       </p:sp>
@@ -16354,13 +16184,6 @@
   <p:clrMapOvr>
     <a:masterClrMapping/>
   </p:clrMapOvr>
-  <p:timing>
-    <p:tnLst>
-      <p:par>
-        <p:cTn id="1" dur="indefinite" restart="never" nodeType="tmRoot"/>
-      </p:par>
-    </p:tnLst>
-  </p:timing>
 </p:sld>
 </file>
 
@@ -16397,10 +16220,9 @@
           <a:lstStyle/>
           <a:p>
             <a:r>
-              <a:rPr lang="en-US" b="1" dirty="0" smtClean="0"/>
+              <a:rPr lang="en-US" b="1" dirty="0"/>
               <a:t>Agenda</a:t>
             </a:r>
-            <a:endParaRPr lang="en-US" b="1" dirty="0"/>
           </a:p>
         </p:txBody>
       </p:sp>
@@ -16420,32 +16242,32 @@
           <a:lstStyle/>
           <a:p>
             <a:r>
-              <a:rPr lang="en-US" dirty="0" err="1" smtClean="0"/>
+              <a:rPr lang="en-US" dirty="0" err="1"/>
               <a:t>Numpy</a:t>
             </a:r>
-            <a:endParaRPr lang="en-US" dirty="0" smtClean="0"/>
-          </a:p>
-          <a:p>
-            <a:r>
-              <a:rPr lang="en-US" b="1" dirty="0" smtClean="0"/>
+            <a:endParaRPr lang="en-US" dirty="0"/>
+          </a:p>
+          <a:p>
+            <a:r>
+              <a:rPr lang="en-US" b="1" dirty="0"/>
               <a:t>Pandas</a:t>
             </a:r>
           </a:p>
           <a:p>
             <a:r>
-              <a:rPr lang="en-US" dirty="0" smtClean="0"/>
+              <a:rPr lang="en-US" dirty="0"/>
               <a:t>Finance</a:t>
             </a:r>
           </a:p>
           <a:p>
             <a:r>
-              <a:rPr lang="en-US" dirty="0" smtClean="0"/>
+              <a:rPr lang="en-US" dirty="0"/>
               <a:t>Group Exercise</a:t>
             </a:r>
           </a:p>
           <a:p>
             <a:r>
-              <a:rPr lang="en-US" dirty="0" smtClean="0"/>
+              <a:rPr lang="en-US" dirty="0"/>
               <a:t>Assignment</a:t>
             </a:r>
           </a:p>
@@ -16461,13 +16283,6 @@
   <p:clrMapOvr>
     <a:masterClrMapping/>
   </p:clrMapOvr>
-  <p:timing>
-    <p:tnLst>
-      <p:par>
-        <p:cTn id="1" dur="indefinite" restart="never" nodeType="tmRoot"/>
-      </p:par>
-    </p:tnLst>
-  </p:timing>
 </p:sld>
 </file>
 
@@ -16504,10 +16319,9 @@
           <a:lstStyle/>
           <a:p>
             <a:r>
-              <a:rPr lang="en-US" dirty="0" smtClean="0"/>
+              <a:rPr lang="en-US" dirty="0"/>
               <a:t>Pandas</a:t>
             </a:r>
-            <a:endParaRPr lang="en-US" dirty="0"/>
           </a:p>
         </p:txBody>
       </p:sp>
@@ -16521,13 +16335,6 @@
   <p:clrMapOvr>
     <a:masterClrMapping/>
   </p:clrMapOvr>
-  <p:timing>
-    <p:tnLst>
-      <p:par>
-        <p:cTn id="1" dur="indefinite" restart="never" nodeType="tmRoot"/>
-      </p:par>
-    </p:tnLst>
-  </p:timing>
 </p:sld>
 </file>
 
@@ -16564,10 +16371,9 @@
           <a:lstStyle/>
           <a:p>
             <a:r>
-              <a:rPr lang="en-US" dirty="0" smtClean="0"/>
+              <a:rPr lang="en-US" dirty="0"/>
               <a:t>Series : pandas 1-D vectors</a:t>
             </a:r>
-            <a:endParaRPr lang="en-US" dirty="0"/>
           </a:p>
         </p:txBody>
       </p:sp>
@@ -16608,7 +16414,7 @@
           <a:p>
             <a:pPr algn="ctr"/>
             <a:r>
-              <a:rPr lang="pt-BR" sz="2200" dirty="0" smtClean="0"/>
+              <a:rPr lang="pt-BR" sz="2200" dirty="0"/>
               <a:t>Series([4, 7, -5, 3])</a:t>
             </a:r>
             <a:endParaRPr lang="en-US" sz="2200" dirty="0"/>
@@ -16638,10 +16444,9 @@
           <a:lstStyle/>
           <a:p>
             <a:r>
-              <a:rPr lang="en-US" sz="2200" dirty="0" smtClean="0"/>
+              <a:rPr lang="en-US" sz="2200" dirty="0"/>
               <a:t>Index: array([0,1,2,3])</a:t>
             </a:r>
-            <a:endParaRPr lang="en-US" sz="2200" dirty="0"/>
           </a:p>
         </p:txBody>
       </p:sp>
@@ -16668,24 +16473,16 @@
           <a:lstStyle/>
           <a:p>
             <a:r>
-              <a:rPr lang="en-US" sz="2200" dirty="0" smtClean="0"/>
+              <a:rPr lang="en-US" sz="2200" dirty="0"/>
               <a:t>Values: </a:t>
             </a:r>
             <a:r>
-              <a:rPr lang="pt-BR" sz="2200" dirty="0" err="1" smtClean="0"/>
+              <a:rPr lang="pt-BR" sz="2200" dirty="0" err="1"/>
               <a:t>array</a:t>
             </a:r>
             <a:r>
               <a:rPr lang="pt-BR" sz="2200" dirty="0"/>
-              <a:t>([ 4, 7, -5, 3</a:t>
-            </a:r>
-            <a:r>
-              <a:rPr lang="pt-BR" sz="2200" dirty="0" smtClean="0"/>
-              <a:t>])</a:t>
-            </a:r>
-            <a:r>
-              <a:rPr lang="pt-BR" sz="2200" dirty="0"/>
-              <a:t/>
+              <a:t>([ 4, 7, -5, 3])</a:t>
             </a:r>
             <a:br>
               <a:rPr lang="pt-BR" sz="2200" dirty="0"/>
@@ -16785,7 +16582,7 @@
           <a:lstStyle/>
           <a:p>
             <a:r>
-              <a:rPr lang="en-US" sz="2200" smtClean="0"/>
+              <a:rPr lang="en-US" sz="2200"/>
               <a:t>Name</a:t>
             </a:r>
             <a:endParaRPr lang="en-US" sz="2200" dirty="0"/>
@@ -16834,13 +16631,6 @@
   <p:clrMapOvr>
     <a:masterClrMapping/>
   </p:clrMapOvr>
-  <p:timing>
-    <p:tnLst>
-      <p:par>
-        <p:cTn id="1" dur="indefinite" restart="never" nodeType="tmRoot"/>
-      </p:par>
-    </p:tnLst>
-  </p:timing>
 </p:sld>
 </file>
 
@@ -16877,10 +16667,9 @@
           <a:lstStyle/>
           <a:p>
             <a:r>
-              <a:rPr lang="en-US" dirty="0" smtClean="0"/>
+              <a:rPr lang="en-US" dirty="0"/>
               <a:t>Series: Index, Values</a:t>
             </a:r>
-            <a:endParaRPr lang="en-US" dirty="0"/>
           </a:p>
         </p:txBody>
       </p:sp>
@@ -16922,18 +16711,17 @@
               <a:defRPr/>
             </a:pPr>
             <a:r>
-              <a:rPr lang="en-US" dirty="0" smtClean="0"/>
+              <a:rPr lang="en-US" dirty="0"/>
               <a:t>2 main Series </a:t>
             </a:r>
             <a:r>
-              <a:rPr lang="en-US" dirty="0" err="1" smtClean="0"/>
+              <a:rPr lang="en-US" dirty="0" err="1"/>
               <a:t>attribues</a:t>
             </a:r>
             <a:r>
-              <a:rPr lang="en-US" dirty="0" smtClean="0"/>
+              <a:rPr lang="en-US" dirty="0"/>
               <a:t>: Index, Values</a:t>
             </a:r>
-            <a:endParaRPr lang="en-US" dirty="0"/>
           </a:p>
         </p:txBody>
       </p:sp>
@@ -17163,10 +16951,9 @@
           <a:lstStyle/>
           <a:p>
             <a:r>
-              <a:rPr lang="en-US" dirty="0" smtClean="0"/>
+              <a:rPr lang="en-US" dirty="0"/>
               <a:t>Series: element selection</a:t>
             </a:r>
-            <a:endParaRPr lang="en-US" dirty="0"/>
           </a:p>
         </p:txBody>
       </p:sp>
@@ -17210,13 +16997,6 @@
   <p:clrMapOvr>
     <a:masterClrMapping/>
   </p:clrMapOvr>
-  <p:timing>
-    <p:tnLst>
-      <p:par>
-        <p:cTn id="1" dur="indefinite" restart="never" nodeType="tmRoot"/>
-      </p:par>
-    </p:tnLst>
-  </p:timing>
 </p:sld>
 </file>
 
@@ -17253,10 +17033,9 @@
           <a:lstStyle/>
           <a:p>
             <a:r>
-              <a:rPr lang="en-US" b="1" dirty="0" smtClean="0"/>
+              <a:rPr lang="en-US" b="1" dirty="0"/>
               <a:t>Agenda</a:t>
             </a:r>
-            <a:endParaRPr lang="en-US" b="1" dirty="0"/>
           </a:p>
         </p:txBody>
       </p:sp>
@@ -17276,32 +17055,32 @@
           <a:lstStyle/>
           <a:p>
             <a:r>
-              <a:rPr lang="en-US" dirty="0" err="1" smtClean="0"/>
+              <a:rPr lang="en-US" dirty="0" err="1"/>
               <a:t>Numpy</a:t>
             </a:r>
-            <a:endParaRPr lang="en-US" dirty="0" smtClean="0"/>
-          </a:p>
-          <a:p>
-            <a:r>
-              <a:rPr lang="en-US" dirty="0" smtClean="0"/>
+            <a:endParaRPr lang="en-US" dirty="0"/>
+          </a:p>
+          <a:p>
+            <a:r>
+              <a:rPr lang="en-US" dirty="0"/>
               <a:t>Pandas</a:t>
             </a:r>
           </a:p>
           <a:p>
             <a:r>
-              <a:rPr lang="en-US" dirty="0" smtClean="0"/>
+              <a:rPr lang="en-US" dirty="0"/>
               <a:t>Finance</a:t>
             </a:r>
           </a:p>
           <a:p>
             <a:r>
-              <a:rPr lang="en-US" dirty="0" smtClean="0"/>
+              <a:rPr lang="en-US" dirty="0"/>
               <a:t>Group Exercise</a:t>
             </a:r>
           </a:p>
           <a:p>
             <a:r>
-              <a:rPr lang="en-US" dirty="0" smtClean="0"/>
+              <a:rPr lang="en-US" dirty="0"/>
               <a:t>Assignment</a:t>
             </a:r>
           </a:p>
@@ -17317,13 +17096,6 @@
   <p:clrMapOvr>
     <a:masterClrMapping/>
   </p:clrMapOvr>
-  <p:timing>
-    <p:tnLst>
-      <p:par>
-        <p:cTn id="1" dur="indefinite" restart="never" nodeType="tmRoot"/>
-      </p:par>
-    </p:tnLst>
-  </p:timing>
 </p:sld>
 </file>
 
@@ -17360,10 +17132,9 @@
           <a:lstStyle/>
           <a:p>
             <a:r>
-              <a:rPr lang="en-US" dirty="0" smtClean="0"/>
+              <a:rPr lang="en-US" dirty="0"/>
               <a:t>Series: membership</a:t>
             </a:r>
-            <a:endParaRPr lang="en-US" dirty="0"/>
           </a:p>
         </p:txBody>
       </p:sp>
@@ -17407,13 +17178,6 @@
   <p:clrMapOvr>
     <a:masterClrMapping/>
   </p:clrMapOvr>
-  <p:timing>
-    <p:tnLst>
-      <p:par>
-        <p:cTn id="1" dur="indefinite" restart="never" nodeType="tmRoot"/>
-      </p:par>
-    </p:tnLst>
-  </p:timing>
 </p:sld>
 </file>
 
@@ -17450,10 +17214,9 @@
           <a:lstStyle/>
           <a:p>
             <a:r>
-              <a:rPr lang="en-US" dirty="0" smtClean="0"/>
+              <a:rPr lang="en-US" dirty="0"/>
               <a:t>Series: element filtering</a:t>
             </a:r>
-            <a:endParaRPr lang="en-US" dirty="0"/>
           </a:p>
         </p:txBody>
       </p:sp>
@@ -17497,13 +17260,6 @@
   <p:clrMapOvr>
     <a:masterClrMapping/>
   </p:clrMapOvr>
-  <p:timing>
-    <p:tnLst>
-      <p:par>
-        <p:cTn id="1" dur="indefinite" restart="never" nodeType="tmRoot"/>
-      </p:par>
-    </p:tnLst>
-  </p:timing>
 </p:sld>
 </file>
 
@@ -17540,10 +17296,9 @@
           <a:lstStyle/>
           <a:p>
             <a:r>
-              <a:rPr lang="en-US" dirty="0" smtClean="0"/>
+              <a:rPr lang="en-US" dirty="0"/>
               <a:t>Series: scalar operations</a:t>
             </a:r>
-            <a:endParaRPr lang="en-US" dirty="0"/>
           </a:p>
         </p:txBody>
       </p:sp>
@@ -17587,13 +17342,6 @@
   <p:clrMapOvr>
     <a:masterClrMapping/>
   </p:clrMapOvr>
-  <p:timing>
-    <p:tnLst>
-      <p:par>
-        <p:cTn id="1" dur="indefinite" restart="never" nodeType="tmRoot"/>
-      </p:par>
-    </p:tnLst>
-  </p:timing>
 </p:sld>
 </file>
 
@@ -17630,14 +17378,13 @@
           <a:lstStyle/>
           <a:p>
             <a:r>
-              <a:rPr lang="en-US" dirty="0" err="1" smtClean="0"/>
+              <a:rPr lang="en-US" dirty="0" err="1"/>
               <a:t>DataFrame</a:t>
             </a:r>
             <a:r>
-              <a:rPr lang="en-US" dirty="0" smtClean="0"/>
+              <a:rPr lang="en-US" dirty="0"/>
               <a:t>: table in pandas</a:t>
             </a:r>
-            <a:endParaRPr lang="en-US" dirty="0"/>
           </a:p>
         </p:txBody>
       </p:sp>
@@ -17711,13 +17458,6 @@
   <p:clrMapOvr>
     <a:masterClrMapping/>
   </p:clrMapOvr>
-  <p:timing>
-    <p:tnLst>
-      <p:par>
-        <p:cTn id="1" dur="indefinite" restart="never" nodeType="tmRoot"/>
-      </p:par>
-    </p:tnLst>
-  </p:timing>
 </p:sld>
 </file>
 
@@ -17754,14 +17494,13 @@
           <a:lstStyle/>
           <a:p>
             <a:r>
-              <a:rPr lang="en-US" dirty="0" err="1" smtClean="0"/>
+              <a:rPr lang="en-US" dirty="0" err="1"/>
               <a:t>DataFrame</a:t>
             </a:r>
             <a:r>
-              <a:rPr lang="en-US" dirty="0" smtClean="0"/>
+              <a:rPr lang="en-US" dirty="0"/>
               <a:t>: table in pandas</a:t>
             </a:r>
-            <a:endParaRPr lang="en-US" dirty="0"/>
           </a:p>
         </p:txBody>
       </p:sp>
@@ -17835,13 +17574,6 @@
   <p:clrMapOvr>
     <a:masterClrMapping/>
   </p:clrMapOvr>
-  <p:timing>
-    <p:tnLst>
-      <p:par>
-        <p:cTn id="1" dur="indefinite" restart="never" nodeType="tmRoot"/>
-      </p:par>
-    </p:tnLst>
-  </p:timing>
 </p:sld>
 </file>
 
@@ -17878,14 +17610,13 @@
           <a:lstStyle/>
           <a:p>
             <a:r>
-              <a:rPr lang="en-US" dirty="0" err="1" smtClean="0"/>
+              <a:rPr lang="en-US" dirty="0" err="1"/>
               <a:t>DataFrame</a:t>
             </a:r>
             <a:r>
-              <a:rPr lang="en-US" dirty="0" smtClean="0"/>
+              <a:rPr lang="en-US" dirty="0"/>
               <a:t>: columns of lists with indices</a:t>
             </a:r>
-            <a:endParaRPr lang="en-US" dirty="0"/>
           </a:p>
         </p:txBody>
       </p:sp>
@@ -17959,13 +17690,6 @@
   <p:clrMapOvr>
     <a:masterClrMapping/>
   </p:clrMapOvr>
-  <p:timing>
-    <p:tnLst>
-      <p:par>
-        <p:cTn id="1" dur="indefinite" restart="never" nodeType="tmRoot"/>
-      </p:par>
-    </p:tnLst>
-  </p:timing>
 </p:sld>
 </file>
 
@@ -18002,14 +17726,13 @@
           <a:lstStyle/>
           <a:p>
             <a:r>
-              <a:rPr lang="en-US" dirty="0" err="1" smtClean="0"/>
+              <a:rPr lang="en-US" dirty="0" err="1"/>
               <a:t>DataFrame</a:t>
             </a:r>
             <a:r>
-              <a:rPr lang="en-US" dirty="0" smtClean="0"/>
+              <a:rPr lang="en-US" dirty="0"/>
               <a:t>: columns</a:t>
             </a:r>
-            <a:endParaRPr lang="en-US" dirty="0"/>
           </a:p>
         </p:txBody>
       </p:sp>
@@ -18314,14 +18037,13 @@
           <a:lstStyle/>
           <a:p>
             <a:r>
-              <a:rPr lang="en-US" dirty="0" err="1" smtClean="0"/>
+              <a:rPr lang="en-US" dirty="0" err="1"/>
               <a:t>DataFrame</a:t>
             </a:r>
             <a:r>
-              <a:rPr lang="en-US" dirty="0" smtClean="0"/>
+              <a:rPr lang="en-US" dirty="0"/>
               <a:t>: inserting data</a:t>
             </a:r>
-            <a:endParaRPr lang="en-US" dirty="0"/>
           </a:p>
         </p:txBody>
       </p:sp>
@@ -18365,13 +18087,6 @@
   <p:clrMapOvr>
     <a:masterClrMapping/>
   </p:clrMapOvr>
-  <p:timing>
-    <p:tnLst>
-      <p:par>
-        <p:cTn id="1" dur="indefinite" restart="never" nodeType="tmRoot"/>
-      </p:par>
-    </p:tnLst>
-  </p:timing>
 </p:sld>
 </file>
 
@@ -18408,14 +18123,13 @@
           <a:lstStyle/>
           <a:p>
             <a:r>
-              <a:rPr lang="en-US" dirty="0" err="1" smtClean="0"/>
+              <a:rPr lang="en-US" dirty="0" err="1"/>
               <a:t>DataFrame</a:t>
             </a:r>
             <a:r>
-              <a:rPr lang="en-US" dirty="0" smtClean="0"/>
+              <a:rPr lang="en-US" dirty="0"/>
               <a:t>: inserting data</a:t>
             </a:r>
-            <a:endParaRPr lang="en-US" dirty="0"/>
           </a:p>
         </p:txBody>
       </p:sp>
@@ -18459,13 +18173,6 @@
   <p:clrMapOvr>
     <a:masterClrMapping/>
   </p:clrMapOvr>
-  <p:timing>
-    <p:tnLst>
-      <p:par>
-        <p:cTn id="1" dur="indefinite" restart="never" nodeType="tmRoot"/>
-      </p:par>
-    </p:tnLst>
-  </p:timing>
 </p:sld>
 </file>
 
@@ -18502,10 +18209,9 @@
           <a:lstStyle/>
           <a:p>
             <a:r>
-              <a:rPr lang="en-US" b="1" dirty="0" smtClean="0"/>
+              <a:rPr lang="en-US" b="1" dirty="0"/>
               <a:t>Agenda</a:t>
             </a:r>
-            <a:endParaRPr lang="en-US" b="1" dirty="0"/>
           </a:p>
         </p:txBody>
       </p:sp>
@@ -18525,32 +18231,32 @@
           <a:lstStyle/>
           <a:p>
             <a:r>
-              <a:rPr lang="en-US" dirty="0" err="1" smtClean="0"/>
+              <a:rPr lang="en-US" dirty="0" err="1"/>
               <a:t>Numpy</a:t>
             </a:r>
-            <a:endParaRPr lang="en-US" dirty="0" smtClean="0"/>
-          </a:p>
-          <a:p>
-            <a:r>
-              <a:rPr lang="en-US" dirty="0" smtClean="0"/>
+            <a:endParaRPr lang="en-US" dirty="0"/>
+          </a:p>
+          <a:p>
+            <a:r>
+              <a:rPr lang="en-US" dirty="0"/>
               <a:t>Pandas</a:t>
             </a:r>
           </a:p>
           <a:p>
             <a:r>
-              <a:rPr lang="en-US" b="1" dirty="0" smtClean="0"/>
+              <a:rPr lang="en-US" b="1" dirty="0"/>
               <a:t>Finance</a:t>
             </a:r>
           </a:p>
           <a:p>
             <a:r>
-              <a:rPr lang="en-US" dirty="0" smtClean="0"/>
+              <a:rPr lang="en-US" dirty="0"/>
               <a:t>Group Exercise</a:t>
             </a:r>
           </a:p>
           <a:p>
             <a:r>
-              <a:rPr lang="en-US" dirty="0" smtClean="0"/>
+              <a:rPr lang="en-US" dirty="0"/>
               <a:t>Assignment</a:t>
             </a:r>
           </a:p>
@@ -18566,13 +18272,6 @@
   <p:clrMapOvr>
     <a:masterClrMapping/>
   </p:clrMapOvr>
-  <p:timing>
-    <p:tnLst>
-      <p:par>
-        <p:cTn id="1" dur="indefinite" restart="never" nodeType="tmRoot"/>
-      </p:par>
-    </p:tnLst>
-  </p:timing>
 </p:sld>
 </file>
 
@@ -18609,10 +18308,9 @@
           <a:lstStyle/>
           <a:p>
             <a:r>
-              <a:rPr lang="en-US" b="1" dirty="0" smtClean="0"/>
+              <a:rPr lang="en-US" b="1" dirty="0"/>
               <a:t>Agenda</a:t>
             </a:r>
-            <a:endParaRPr lang="en-US" b="1" dirty="0"/>
           </a:p>
         </p:txBody>
       </p:sp>
@@ -18632,32 +18330,32 @@
           <a:lstStyle/>
           <a:p>
             <a:r>
-              <a:rPr lang="en-US" b="1" dirty="0" err="1" smtClean="0"/>
+              <a:rPr lang="en-US" b="1" dirty="0" err="1"/>
               <a:t>Numpy</a:t>
             </a:r>
-            <a:endParaRPr lang="en-US" b="1" dirty="0" smtClean="0"/>
-          </a:p>
-          <a:p>
-            <a:r>
-              <a:rPr lang="en-US" dirty="0" smtClean="0"/>
+            <a:endParaRPr lang="en-US" b="1" dirty="0"/>
+          </a:p>
+          <a:p>
+            <a:r>
+              <a:rPr lang="en-US" dirty="0"/>
               <a:t>Pandas</a:t>
             </a:r>
           </a:p>
           <a:p>
             <a:r>
-              <a:rPr lang="en-US" dirty="0" smtClean="0"/>
+              <a:rPr lang="en-US" dirty="0"/>
               <a:t>Finance</a:t>
             </a:r>
           </a:p>
           <a:p>
             <a:r>
-              <a:rPr lang="en-US" dirty="0" smtClean="0"/>
+              <a:rPr lang="en-US" dirty="0"/>
               <a:t>Group Exercise</a:t>
             </a:r>
           </a:p>
           <a:p>
             <a:r>
-              <a:rPr lang="en-US" dirty="0" smtClean="0"/>
+              <a:rPr lang="en-US" dirty="0"/>
               <a:t>Assignment</a:t>
             </a:r>
           </a:p>
@@ -18673,13 +18371,6 @@
   <p:clrMapOvr>
     <a:masterClrMapping/>
   </p:clrMapOvr>
-  <p:timing>
-    <p:tnLst>
-      <p:par>
-        <p:cTn id="1" dur="indefinite" restart="never" nodeType="tmRoot"/>
-      </p:par>
-    </p:tnLst>
-  </p:timing>
 </p:sld>
 </file>
 
@@ -18716,10 +18407,9 @@
           <a:lstStyle/>
           <a:p>
             <a:r>
-              <a:rPr lang="en-US" dirty="0" smtClean="0"/>
+              <a:rPr lang="en-US" dirty="0"/>
               <a:t>Getting Yahoo Finance Data</a:t>
             </a:r>
-            <a:endParaRPr lang="en-US" dirty="0"/>
           </a:p>
         </p:txBody>
       </p:sp>
@@ -18799,11 +18489,11 @@
           <a:lstStyle/>
           <a:p>
             <a:r>
-              <a:rPr lang="en-US" dirty="0" smtClean="0"/>
+              <a:rPr lang="en-US" dirty="0"/>
               <a:t>Stock data as </a:t>
             </a:r>
             <a:r>
-              <a:rPr lang="en-US" dirty="0" err="1" smtClean="0"/>
+              <a:rPr lang="en-US" dirty="0" err="1"/>
               <a:t>DataFrame</a:t>
             </a:r>
             <a:endParaRPr lang="en-US" dirty="0"/>
@@ -18886,11 +18576,11 @@
           <a:lstStyle/>
           <a:p>
             <a:r>
-              <a:rPr lang="en-US" dirty="0" smtClean="0"/>
+              <a:rPr lang="en-US" dirty="0"/>
               <a:t>Stock data as </a:t>
             </a:r>
             <a:r>
-              <a:rPr lang="en-US" dirty="0" err="1" smtClean="0"/>
+              <a:rPr lang="en-US" dirty="0" err="1"/>
               <a:t>DataFrame</a:t>
             </a:r>
             <a:endParaRPr lang="en-US" dirty="0"/>
@@ -18973,10 +18663,9 @@
           <a:lstStyle/>
           <a:p>
             <a:r>
-              <a:rPr lang="en-US" dirty="0" smtClean="0"/>
+              <a:rPr lang="en-US" dirty="0"/>
               <a:t>Correlation among stocks</a:t>
             </a:r>
-            <a:endParaRPr lang="en-US" dirty="0"/>
           </a:p>
         </p:txBody>
       </p:sp>
@@ -19078,30 +18767,29 @@
           <a:lstStyle/>
           <a:p>
             <a:r>
-              <a:rPr lang="en-US" dirty="0" smtClean="0"/>
+              <a:rPr lang="en-US" dirty="0"/>
               <a:t>Form groups of 4 students</a:t>
             </a:r>
           </a:p>
           <a:p>
             <a:r>
-              <a:rPr lang="en-US" b="1" dirty="0" smtClean="0"/>
+              <a:rPr lang="en-US" b="1" dirty="0"/>
               <a:t>Exercise 1</a:t>
             </a:r>
             <a:r>
-              <a:rPr lang="en-US" dirty="0" smtClean="0"/>
+              <a:rPr lang="en-US" dirty="0"/>
               <a:t>: find list of all Dow Jones component stock tickers</a:t>
             </a:r>
           </a:p>
           <a:p>
             <a:r>
-              <a:rPr lang="en-US" b="1" dirty="0" smtClean="0"/>
+              <a:rPr lang="en-US" b="1" dirty="0"/>
               <a:t>Exercise 2</a:t>
             </a:r>
             <a:r>
-              <a:rPr lang="en-US" dirty="0" smtClean="0"/>
+              <a:rPr lang="en-US" dirty="0"/>
               <a:t>: search &amp; discuss how the Dow Jones component stock values are related to the Dow Jones Industrial Index value.</a:t>
             </a:r>
-            <a:endParaRPr lang="en-US" dirty="0"/>
           </a:p>
         </p:txBody>
       </p:sp>
@@ -19151,10 +18839,9 @@
           <a:lstStyle/>
           <a:p>
             <a:r>
-              <a:rPr lang="en-US" dirty="0" smtClean="0"/>
+              <a:rPr lang="en-US" dirty="0"/>
               <a:t>Assignment: Dow Jones </a:t>
             </a:r>
-            <a:endParaRPr lang="en-US" dirty="0"/>
           </a:p>
         </p:txBody>
       </p:sp>
@@ -19204,7 +18891,7 @@
           <a:lstStyle/>
           <a:p>
             <a:r>
-              <a:rPr lang="en-US" dirty="0" err="1" smtClean="0"/>
+              <a:rPr lang="en-US" dirty="0" err="1"/>
               <a:t>NumPy</a:t>
             </a:r>
             <a:endParaRPr lang="en-US" dirty="0"/>

</xml_diff>